<commit_message>
correct ppt file added
</commit_message>
<xml_diff>
--- a/docs/figures/BGDMH-data-mgmt-teaching-resource.pptx
+++ b/docs/figures/BGDMH-data-mgmt-teaching-resource.pptx
@@ -128,13 +128,18 @@
       </a:defRPr>
     </a:lvl9pPr>
   </p:defaultTextStyle>
+  <p:extLst>
+    <p:ext uri="{EFAFB233-063F-42B5-8137-9DF3F51BA10A}">
+      <p15:sldGuideLst xmlns:p15="http://schemas.microsoft.com/office/powerpoint/2012/main"/>
+    </p:ext>
+  </p:extLst>
 </p:presentation>
 </file>
 
 <file path=ppt/revisionInfo.xml><?xml version="1.0" encoding="utf-8"?>
 <p1510:revInfo xmlns:a="http://schemas.openxmlformats.org/drawingml/2006/main" xmlns:r="http://schemas.openxmlformats.org/officeDocument/2006/relationships" xmlns:p1510="http://schemas.microsoft.com/office/powerpoint/2015/10/main">
   <p1510:revLst>
-    <p1510:client id="{9B8A0B7C-4454-41BB-9C7A-A9676A665B64}" v="2" dt="2023-06-09T03:51:35.831"/>
+    <p1510:client id="{9B8A0B7C-4454-41BB-9C7A-A9676A665B64}" v="4" dt="2023-06-11T06:18:38.385"/>
   </p1510:revLst>
 </p1510:revInfo>
 </file>
@@ -143,11 +148,136 @@
 <pc:chgInfo xmlns:a="http://schemas.openxmlformats.org/drawingml/2006/main" xmlns:r="http://schemas.openxmlformats.org/officeDocument/2006/relationships" xmlns:ac="http://schemas.microsoft.com/office/drawing/2013/main/command" xmlns:pc="http://schemas.microsoft.com/office/powerpoint/2013/main/command">
   <pc:docChgLst>
     <pc:chgData name="Natalie Forsdick" userId="39de4631-7956-44ee-9814-e56a26cbff04" providerId="ADAL" clId="{9B8A0B7C-4454-41BB-9C7A-A9676A665B64}"/>
-    <pc:docChg chg="addSld delSld modSld">
-      <pc:chgData name="Natalie Forsdick" userId="39de4631-7956-44ee-9814-e56a26cbff04" providerId="ADAL" clId="{9B8A0B7C-4454-41BB-9C7A-A9676A665B64}" dt="2023-06-09T03:51:35.830" v="2"/>
+    <pc:docChg chg="undo custSel addSld delSld modSld">
+      <pc:chgData name="Natalie Forsdick" userId="39de4631-7956-44ee-9814-e56a26cbff04" providerId="ADAL" clId="{9B8A0B7C-4454-41BB-9C7A-A9676A665B64}" dt="2023-06-11T07:00:51.178" v="52" actId="20577"/>
       <pc:docMkLst>
         <pc:docMk/>
       </pc:docMkLst>
+      <pc:sldChg chg="modSp mod">
+        <pc:chgData name="Natalie Forsdick" userId="39de4631-7956-44ee-9814-e56a26cbff04" providerId="ADAL" clId="{9B8A0B7C-4454-41BB-9C7A-A9676A665B64}" dt="2023-06-11T07:00:51.178" v="52" actId="20577"/>
+        <pc:sldMkLst>
+          <pc:docMk/>
+          <pc:sldMk cId="0" sldId="267"/>
+        </pc:sldMkLst>
+        <pc:spChg chg="mod">
+          <ac:chgData name="Natalie Forsdick" userId="39de4631-7956-44ee-9814-e56a26cbff04" providerId="ADAL" clId="{9B8A0B7C-4454-41BB-9C7A-A9676A665B64}" dt="2023-06-11T07:00:51.178" v="52" actId="20577"/>
+          <ac:spMkLst>
+            <pc:docMk/>
+            <pc:sldMk cId="0" sldId="267"/>
+            <ac:spMk id="203" creationId="{00000000-0000-0000-0000-000000000000}"/>
+          </ac:spMkLst>
+        </pc:spChg>
+      </pc:sldChg>
+      <pc:sldChg chg="addSp delSp modSp mod">
+        <pc:chgData name="Natalie Forsdick" userId="39de4631-7956-44ee-9814-e56a26cbff04" providerId="ADAL" clId="{9B8A0B7C-4454-41BB-9C7A-A9676A665B64}" dt="2023-06-11T06:19:36.424" v="43" actId="478"/>
+        <pc:sldMkLst>
+          <pc:docMk/>
+          <pc:sldMk cId="0" sldId="269"/>
+        </pc:sldMkLst>
+        <pc:spChg chg="mod">
+          <ac:chgData name="Natalie Forsdick" userId="39de4631-7956-44ee-9814-e56a26cbff04" providerId="ADAL" clId="{9B8A0B7C-4454-41BB-9C7A-A9676A665B64}" dt="2023-06-11T06:19:25.505" v="41" actId="1076"/>
+          <ac:spMkLst>
+            <pc:docMk/>
+            <pc:sldMk cId="0" sldId="269"/>
+            <ac:spMk id="9" creationId="{5878BC4B-F8CA-E72D-D9E6-A1AFCDA341A1}"/>
+          </ac:spMkLst>
+        </pc:spChg>
+        <pc:spChg chg="mod">
+          <ac:chgData name="Natalie Forsdick" userId="39de4631-7956-44ee-9814-e56a26cbff04" providerId="ADAL" clId="{9B8A0B7C-4454-41BB-9C7A-A9676A665B64}" dt="2023-06-11T06:18:29.253" v="35" actId="207"/>
+          <ac:spMkLst>
+            <pc:docMk/>
+            <pc:sldMk cId="0" sldId="269"/>
+            <ac:spMk id="10" creationId="{7C4691F8-F6B2-F75D-6F2B-838282DBE722}"/>
+          </ac:spMkLst>
+        </pc:spChg>
+        <pc:spChg chg="mod">
+          <ac:chgData name="Natalie Forsdick" userId="39de4631-7956-44ee-9814-e56a26cbff04" providerId="ADAL" clId="{9B8A0B7C-4454-41BB-9C7A-A9676A665B64}" dt="2023-06-11T06:19:25.505" v="41" actId="1076"/>
+          <ac:spMkLst>
+            <pc:docMk/>
+            <pc:sldMk cId="0" sldId="269"/>
+            <ac:spMk id="11" creationId="{33CC43FC-C7B4-88A9-AA81-37E466439A6A}"/>
+          </ac:spMkLst>
+        </pc:spChg>
+        <pc:spChg chg="mod">
+          <ac:chgData name="Natalie Forsdick" userId="39de4631-7956-44ee-9814-e56a26cbff04" providerId="ADAL" clId="{9B8A0B7C-4454-41BB-9C7A-A9676A665B64}" dt="2023-06-11T06:19:25.505" v="41" actId="1076"/>
+          <ac:spMkLst>
+            <pc:docMk/>
+            <pc:sldMk cId="0" sldId="269"/>
+            <ac:spMk id="12" creationId="{0B510294-8203-94C7-A3C4-76FBE8767A9C}"/>
+          </ac:spMkLst>
+        </pc:spChg>
+        <pc:picChg chg="add del mod">
+          <ac:chgData name="Natalie Forsdick" userId="39de4631-7956-44ee-9814-e56a26cbff04" providerId="ADAL" clId="{9B8A0B7C-4454-41BB-9C7A-A9676A665B64}" dt="2023-06-11T06:19:04.194" v="39" actId="478"/>
+          <ac:picMkLst>
+            <pc:docMk/>
+            <pc:sldMk cId="0" sldId="269"/>
+            <ac:picMk id="7" creationId="{D79B27AA-E191-BE85-6FB7-BB78501569CB}"/>
+          </ac:picMkLst>
+        </pc:picChg>
+        <pc:picChg chg="add del mod">
+          <ac:chgData name="Natalie Forsdick" userId="39de4631-7956-44ee-9814-e56a26cbff04" providerId="ADAL" clId="{9B8A0B7C-4454-41BB-9C7A-A9676A665B64}" dt="2023-06-11T06:19:36.424" v="43" actId="478"/>
+          <ac:picMkLst>
+            <pc:docMk/>
+            <pc:sldMk cId="0" sldId="269"/>
+            <ac:picMk id="8" creationId="{AF122118-11FF-FFF7-1692-89E4C7167AAB}"/>
+          </ac:picMkLst>
+        </pc:picChg>
+        <pc:picChg chg="add del mod">
+          <ac:chgData name="Natalie Forsdick" userId="39de4631-7956-44ee-9814-e56a26cbff04" providerId="ADAL" clId="{9B8A0B7C-4454-41BB-9C7A-A9676A665B64}" dt="2023-06-11T06:18:16.162" v="34" actId="478"/>
+          <ac:picMkLst>
+            <pc:docMk/>
+            <pc:sldMk cId="0" sldId="269"/>
+            <ac:picMk id="226" creationId="{00000000-0000-0000-0000-000000000000}"/>
+          </ac:picMkLst>
+        </pc:picChg>
+        <pc:picChg chg="mod">
+          <ac:chgData name="Natalie Forsdick" userId="39de4631-7956-44ee-9814-e56a26cbff04" providerId="ADAL" clId="{9B8A0B7C-4454-41BB-9C7A-A9676A665B64}" dt="2023-06-11T06:19:25.505" v="41" actId="1076"/>
+          <ac:picMkLst>
+            <pc:docMk/>
+            <pc:sldMk cId="0" sldId="269"/>
+            <ac:picMk id="227" creationId="{00000000-0000-0000-0000-000000000000}"/>
+          </ac:picMkLst>
+        </pc:picChg>
+        <pc:picChg chg="mod">
+          <ac:chgData name="Natalie Forsdick" userId="39de4631-7956-44ee-9814-e56a26cbff04" providerId="ADAL" clId="{9B8A0B7C-4454-41BB-9C7A-A9676A665B64}" dt="2023-06-11T06:19:25.505" v="41" actId="1076"/>
+          <ac:picMkLst>
+            <pc:docMk/>
+            <pc:sldMk cId="0" sldId="269"/>
+            <ac:picMk id="228" creationId="{00000000-0000-0000-0000-000000000000}"/>
+          </ac:picMkLst>
+        </pc:picChg>
+        <pc:picChg chg="mod">
+          <ac:chgData name="Natalie Forsdick" userId="39de4631-7956-44ee-9814-e56a26cbff04" providerId="ADAL" clId="{9B8A0B7C-4454-41BB-9C7A-A9676A665B64}" dt="2023-06-11T06:19:25.505" v="41" actId="1076"/>
+          <ac:picMkLst>
+            <pc:docMk/>
+            <pc:sldMk cId="0" sldId="269"/>
+            <ac:picMk id="229" creationId="{00000000-0000-0000-0000-000000000000}"/>
+          </ac:picMkLst>
+        </pc:picChg>
+      </pc:sldChg>
+      <pc:sldChg chg="modSp mod">
+        <pc:chgData name="Natalie Forsdick" userId="39de4631-7956-44ee-9814-e56a26cbff04" providerId="ADAL" clId="{9B8A0B7C-4454-41BB-9C7A-A9676A665B64}" dt="2023-06-09T04:52:57.137" v="24" actId="20577"/>
+        <pc:sldMkLst>
+          <pc:docMk/>
+          <pc:sldMk cId="0" sldId="278"/>
+        </pc:sldMkLst>
+        <pc:spChg chg="mod">
+          <ac:chgData name="Natalie Forsdick" userId="39de4631-7956-44ee-9814-e56a26cbff04" providerId="ADAL" clId="{9B8A0B7C-4454-41BB-9C7A-A9676A665B64}" dt="2023-06-09T04:52:57.137" v="24" actId="20577"/>
+          <ac:spMkLst>
+            <pc:docMk/>
+            <pc:sldMk cId="0" sldId="278"/>
+            <ac:spMk id="92" creationId="{00000000-0000-0000-0000-000000000000}"/>
+          </ac:spMkLst>
+        </pc:spChg>
+        <pc:spChg chg="mod">
+          <ac:chgData name="Natalie Forsdick" userId="39de4631-7956-44ee-9814-e56a26cbff04" providerId="ADAL" clId="{9B8A0B7C-4454-41BB-9C7A-A9676A665B64}" dt="2023-06-09T04:52:11.769" v="13" actId="20577"/>
+          <ac:spMkLst>
+            <pc:docMk/>
+            <pc:sldMk cId="0" sldId="278"/>
+            <ac:spMk id="93" creationId="{00000000-0000-0000-0000-000000000000}"/>
+          </ac:spMkLst>
+        </pc:spChg>
+      </pc:sldChg>
       <pc:sldChg chg="add setBg">
         <pc:chgData name="Natalie Forsdick" userId="39de4631-7956-44ee-9814-e56a26cbff04" providerId="ADAL" clId="{9B8A0B7C-4454-41BB-9C7A-A9676A665B64}" dt="2023-06-09T03:51:35.830" v="2"/>
         <pc:sldMkLst>
@@ -249,7 +379,7 @@
           <a:p>
             <a:fld id="{07953DAB-C3B0-4659-83D0-A542DEC54766}" type="datetimeFigureOut">
               <a:rPr lang="en-NZ" smtClean="0"/>
-              <a:t>8/06/2023</a:t>
+              <a:t>11/06/2023</a:t>
             </a:fld>
             <a:endParaRPr lang="en-NZ"/>
           </a:p>
@@ -1068,7 +1198,7 @@
               </a:spcAft>
               <a:buNone/>
             </a:pPr>
-            <a:endParaRPr/>
+            <a:endParaRPr dirty="0"/>
           </a:p>
         </p:txBody>
       </p:sp>
@@ -3540,7 +3670,7 @@
           <a:p>
             <a:fld id="{DA17F237-42E0-447F-8B16-03E7D828AB3B}" type="datetimeFigureOut">
               <a:rPr lang="en-NZ" smtClean="0"/>
-              <a:t>8/06/2023</a:t>
+              <a:t>11/06/2023</a:t>
             </a:fld>
             <a:endParaRPr lang="en-NZ"/>
           </a:p>
@@ -3740,7 +3870,7 @@
           <a:p>
             <a:fld id="{DA17F237-42E0-447F-8B16-03E7D828AB3B}" type="datetimeFigureOut">
               <a:rPr lang="en-NZ" smtClean="0"/>
-              <a:t>8/06/2023</a:t>
+              <a:t>11/06/2023</a:t>
             </a:fld>
             <a:endParaRPr lang="en-NZ"/>
           </a:p>
@@ -3950,7 +4080,7 @@
           <a:p>
             <a:fld id="{DA17F237-42E0-447F-8B16-03E7D828AB3B}" type="datetimeFigureOut">
               <a:rPr lang="en-NZ" smtClean="0"/>
-              <a:t>8/06/2023</a:t>
+              <a:t>11/06/2023</a:t>
             </a:fld>
             <a:endParaRPr lang="en-NZ"/>
           </a:p>
@@ -4773,7 +4903,7 @@
           <a:p>
             <a:fld id="{DA17F237-42E0-447F-8B16-03E7D828AB3B}" type="datetimeFigureOut">
               <a:rPr lang="en-NZ" smtClean="0"/>
-              <a:t>8/06/2023</a:t>
+              <a:t>11/06/2023</a:t>
             </a:fld>
             <a:endParaRPr lang="en-NZ"/>
           </a:p>
@@ -5049,7 +5179,7 @@
           <a:p>
             <a:fld id="{DA17F237-42E0-447F-8B16-03E7D828AB3B}" type="datetimeFigureOut">
               <a:rPr lang="en-NZ" smtClean="0"/>
-              <a:t>8/06/2023</a:t>
+              <a:t>11/06/2023</a:t>
             </a:fld>
             <a:endParaRPr lang="en-NZ"/>
           </a:p>
@@ -5317,7 +5447,7 @@
           <a:p>
             <a:fld id="{DA17F237-42E0-447F-8B16-03E7D828AB3B}" type="datetimeFigureOut">
               <a:rPr lang="en-NZ" smtClean="0"/>
-              <a:t>8/06/2023</a:t>
+              <a:t>11/06/2023</a:t>
             </a:fld>
             <a:endParaRPr lang="en-NZ"/>
           </a:p>
@@ -5732,7 +5862,7 @@
           <a:p>
             <a:fld id="{DA17F237-42E0-447F-8B16-03E7D828AB3B}" type="datetimeFigureOut">
               <a:rPr lang="en-NZ" smtClean="0"/>
-              <a:t>8/06/2023</a:t>
+              <a:t>11/06/2023</a:t>
             </a:fld>
             <a:endParaRPr lang="en-NZ"/>
           </a:p>
@@ -5874,7 +6004,7 @@
           <a:p>
             <a:fld id="{DA17F237-42E0-447F-8B16-03E7D828AB3B}" type="datetimeFigureOut">
               <a:rPr lang="en-NZ" smtClean="0"/>
-              <a:t>8/06/2023</a:t>
+              <a:t>11/06/2023</a:t>
             </a:fld>
             <a:endParaRPr lang="en-NZ"/>
           </a:p>
@@ -5987,7 +6117,7 @@
           <a:p>
             <a:fld id="{DA17F237-42E0-447F-8B16-03E7D828AB3B}" type="datetimeFigureOut">
               <a:rPr lang="en-NZ" smtClean="0"/>
-              <a:t>8/06/2023</a:t>
+              <a:t>11/06/2023</a:t>
             </a:fld>
             <a:endParaRPr lang="en-NZ"/>
           </a:p>
@@ -6300,7 +6430,7 @@
           <a:p>
             <a:fld id="{DA17F237-42E0-447F-8B16-03E7D828AB3B}" type="datetimeFigureOut">
               <a:rPr lang="en-NZ" smtClean="0"/>
-              <a:t>8/06/2023</a:t>
+              <a:t>11/06/2023</a:t>
             </a:fld>
             <a:endParaRPr lang="en-NZ"/>
           </a:p>
@@ -6589,7 +6719,7 @@
           <a:p>
             <a:fld id="{DA17F237-42E0-447F-8B16-03E7D828AB3B}" type="datetimeFigureOut">
               <a:rPr lang="en-NZ" smtClean="0"/>
-              <a:t>8/06/2023</a:t>
+              <a:t>11/06/2023</a:t>
             </a:fld>
             <a:endParaRPr lang="en-NZ"/>
           </a:p>
@@ -6832,7 +6962,7 @@
           <a:p>
             <a:fld id="{DA17F237-42E0-447F-8B16-03E7D828AB3B}" type="datetimeFigureOut">
               <a:rPr lang="en-NZ" smtClean="0"/>
-              <a:t>8/06/2023</a:t>
+              <a:t>11/06/2023</a:t>
             </a:fld>
             <a:endParaRPr lang="en-NZ"/>
           </a:p>
@@ -8476,9 +8606,21 @@
                 <a:cs typeface="Avenir"/>
                 <a:sym typeface="Avenir"/>
               </a:rPr>
-              <a:t> compute and data storage needs for diverse research projects</a:t>
-            </a:r>
-            <a:endParaRPr sz="1867">
+              <a:t> </a:t>
+            </a:r>
+            <a:r>
+              <a:rPr lang="en" sz="1867" dirty="0">
+                <a:solidFill>
+                  <a:schemeClr val="lt1"/>
+                </a:solidFill>
+                <a:latin typeface="Avenir"/>
+                <a:ea typeface="Avenir"/>
+                <a:cs typeface="Avenir"/>
+                <a:sym typeface="Avenir"/>
+              </a:rPr>
+              <a:t>compute and data storage needs for diverse research projects</a:t>
+            </a:r>
+            <a:endParaRPr sz="1867" dirty="0">
               <a:solidFill>
                 <a:schemeClr val="lt1"/>
               </a:solidFill>
@@ -9342,16 +9484,14 @@
         </p:nvSpPr>
         <p:spPr>
           <a:xfrm>
-            <a:off x="272076" y="1036397"/>
+            <a:off x="272076" y="1055742"/>
             <a:ext cx="2093023" cy="5028225"/>
           </a:xfrm>
           <a:prstGeom prst="ellipse">
             <a:avLst/>
           </a:prstGeom>
           <a:solidFill>
-            <a:srgbClr val="A7E654">
-              <a:alpha val="89020"/>
-            </a:srgbClr>
+            <a:srgbClr val="4BA657"/>
           </a:solidFill>
           <a:ln>
             <a:noFill/>
@@ -9400,7 +9540,7 @@
         </p:blipFill>
         <p:spPr>
           <a:xfrm>
-            <a:off x="551668" y="1267369"/>
+            <a:off x="551625" y="1286714"/>
             <a:ext cx="2026219" cy="5307456"/>
           </a:xfrm>
           <a:prstGeom prst="rect">
@@ -9835,7 +9975,7 @@
             <a:avLst/>
           </a:prstGeom>
           <a:solidFill>
-            <a:srgbClr val="F0C462"/>
+            <a:srgbClr val="F6CB48"/>
           </a:solidFill>
           <a:ln>
             <a:noFill/>
@@ -10005,14 +10145,14 @@
         </p:nvSpPr>
         <p:spPr>
           <a:xfrm>
-            <a:off x="7389053" y="1267369"/>
+            <a:off x="7389053" y="1286714"/>
             <a:ext cx="1974994" cy="5028225"/>
           </a:xfrm>
           <a:prstGeom prst="ellipse">
             <a:avLst/>
           </a:prstGeom>
           <a:solidFill>
-            <a:srgbClr val="C57FDB"/>
+            <a:srgbClr val="D43086"/>
           </a:solidFill>
           <a:ln>
             <a:noFill/>
@@ -10060,14 +10200,14 @@
         </p:nvSpPr>
         <p:spPr>
           <a:xfrm>
-            <a:off x="10336071" y="1111986"/>
+            <a:off x="10336071" y="1131331"/>
             <a:ext cx="1803111" cy="5028225"/>
           </a:xfrm>
           <a:prstGeom prst="ellipse">
             <a:avLst/>
           </a:prstGeom>
           <a:solidFill>
-            <a:srgbClr val="70C8DA"/>
+            <a:srgbClr val="459FDD"/>
           </a:solidFill>
           <a:ln>
             <a:noFill/>
@@ -10116,7 +10256,7 @@
         </p:blipFill>
         <p:spPr>
           <a:xfrm flipH="1">
-            <a:off x="6957827" y="1498342"/>
+            <a:off x="6957827" y="1517687"/>
             <a:ext cx="2114328" cy="5119665"/>
           </a:xfrm>
           <a:prstGeom prst="rect">
@@ -10143,7 +10283,7 @@
         </p:blipFill>
         <p:spPr>
           <a:xfrm flipH="1">
-            <a:off x="9934609" y="1342959"/>
+            <a:off x="9934609" y="1362304"/>
             <a:ext cx="1686831" cy="5231848"/>
           </a:xfrm>
           <a:prstGeom prst="rect">
@@ -10157,7 +10297,13 @@
       </p:pic>
       <p:pic>
         <p:nvPicPr>
-          <p:cNvPr id="226" name="Google Shape;226;g23c3aa5ce8d_0_600"/>
+          <p:cNvPr id="8" name="Google Shape;130;p5">
+            <a:extLst>
+              <a:ext uri="{FF2B5EF4-FFF2-40B4-BE49-F238E27FC236}">
+                <a16:creationId xmlns:a16="http://schemas.microsoft.com/office/drawing/2014/main" id="{AF122118-11FF-FFF7-1692-89E4C7167AAB}"/>
+              </a:ext>
+            </a:extLst>
+          </p:cNvPr>
           <p:cNvPicPr preferRelativeResize="0"/>
           <p:nvPr/>
         </p:nvPicPr>
@@ -10170,7 +10316,7 @@
         </p:blipFill>
         <p:spPr>
           <a:xfrm>
-            <a:off x="3115318" y="1170411"/>
+            <a:off x="3087817" y="859748"/>
             <a:ext cx="2889111" cy="5576979"/>
           </a:xfrm>
           <a:prstGeom prst="rect">
@@ -13986,7 +14132,7 @@
               <a:buNone/>
             </a:pPr>
             <a:r>
-              <a:rPr lang="en" sz="2133" i="1">
+              <a:rPr lang="en" sz="2133" i="1" dirty="0">
                 <a:solidFill>
                   <a:schemeClr val="lt1"/>
                 </a:solidFill>
@@ -13997,7 +14143,7 @@
               </a:rPr>
               <a:t>The processes and practices associated with the documentation and storage of and access to data and associated metadata throughout the research lifecycle.</a:t>
             </a:r>
-            <a:endParaRPr sz="2133">
+            <a:endParaRPr sz="2133" dirty="0">
               <a:solidFill>
                 <a:schemeClr val="lt1"/>
               </a:solidFill>
@@ -14011,7 +14157,7 @@
             <a:pPr marL="152396" indent="0" algn="ctr">
               <a:buNone/>
             </a:pPr>
-            <a:endParaRPr sz="2133">
+            <a:endParaRPr sz="2133" dirty="0">
               <a:solidFill>
                 <a:schemeClr val="lt1"/>
               </a:solidFill>
@@ -14025,7 +14171,7 @@
             <a:pPr marL="152396" indent="0" algn="ctr">
               <a:buNone/>
             </a:pPr>
-            <a:endParaRPr sz="2133">
+            <a:endParaRPr sz="2133" dirty="0">
               <a:solidFill>
                 <a:schemeClr val="lt1"/>
               </a:solidFill>
@@ -14039,7 +14185,7 @@
             <a:pPr marL="152396" indent="0" algn="ctr">
               <a:buNone/>
             </a:pPr>
-            <a:endParaRPr sz="2133">
+            <a:endParaRPr sz="2133" dirty="0">
               <a:solidFill>
                 <a:schemeClr val="lt1"/>
               </a:solidFill>
@@ -14053,7 +14199,7 @@
             <a:pPr marL="152396" indent="0" algn="ctr">
               <a:buNone/>
             </a:pPr>
-            <a:endParaRPr sz="2133">
+            <a:endParaRPr sz="2133" dirty="0">
               <a:solidFill>
                 <a:schemeClr val="lt1"/>
               </a:solidFill>
@@ -14405,7 +14551,7 @@
           <a:p>
             <a:pPr algn="ctr"/>
             <a:r>
-              <a:rPr lang="en" sz="2000" b="1">
+              <a:rPr lang="en" sz="2000" b="1" dirty="0">
                 <a:solidFill>
                   <a:schemeClr val="lt1"/>
                 </a:solidFill>
@@ -14416,7 +14562,7 @@
               </a:rPr>
               <a:t>WHO?</a:t>
             </a:r>
-            <a:endParaRPr sz="2000" b="1">
+            <a:endParaRPr sz="2000" b="1" dirty="0">
               <a:solidFill>
                 <a:schemeClr val="lt1"/>
               </a:solidFill>
@@ -15641,14 +15787,14 @@
           <a:lstStyle/>
           <a:p>
             <a:r>
-              <a:rPr lang="en">
+              <a:rPr lang="en" dirty="0">
                 <a:solidFill>
                   <a:schemeClr val="lt1"/>
                 </a:solidFill>
               </a:rPr>
-              <a:t>Be FAIR and CARE </a:t>
-            </a:r>
-            <a:endParaRPr>
+              <a:t>The goals: Be FAIR and CARE </a:t>
+            </a:r>
+            <a:endParaRPr dirty="0">
               <a:solidFill>
                 <a:schemeClr val="lt1"/>
               </a:solidFill>
@@ -15687,14 +15833,14 @@
               </a:buClr>
             </a:pPr>
             <a:r>
-              <a:rPr lang="en">
+              <a:rPr lang="en" dirty="0">
                 <a:solidFill>
                   <a:schemeClr val="lt1"/>
                 </a:solidFill>
               </a:rPr>
               <a:t>FAIR data principles largely provide technical guidance</a:t>
             </a:r>
-            <a:endParaRPr>
+            <a:endParaRPr dirty="0">
               <a:solidFill>
                 <a:schemeClr val="lt1"/>
               </a:solidFill>
@@ -15704,7 +15850,7 @@
             <a:pPr indent="0">
               <a:buNone/>
             </a:pPr>
-            <a:endParaRPr>
+            <a:endParaRPr dirty="0">
               <a:solidFill>
                 <a:schemeClr val="lt1"/>
               </a:solidFill>
@@ -15714,7 +15860,7 @@
             <a:pPr indent="0">
               <a:buNone/>
             </a:pPr>
-            <a:endParaRPr>
+            <a:endParaRPr dirty="0">
               <a:solidFill>
                 <a:schemeClr val="lt1"/>
               </a:solidFill>
@@ -15727,14 +15873,14 @@
               </a:buClr>
             </a:pPr>
             <a:r>
-              <a:rPr lang="en">
+              <a:rPr lang="en" dirty="0">
                 <a:solidFill>
                   <a:schemeClr val="lt1"/>
                 </a:solidFill>
               </a:rPr>
-              <a:t>CARE data principles provide guidance on engaging with Indigenous data</a:t>
-            </a:r>
-            <a:endParaRPr>
+              <a:t>CARE data principles provide guidance on interacting with Indigenous data</a:t>
+            </a:r>
+            <a:endParaRPr dirty="0">
               <a:solidFill>
                 <a:schemeClr val="lt1"/>
               </a:solidFill>

</xml_diff>